<commit_message>
time series + ejercicios extra pandas
</commit_message>
<xml_diff>
--- a/2-Data Analysis/documentacion/Recap.pptx
+++ b/2-Data Analysis/documentacion/Recap.pptx
@@ -5105,6 +5105,54 @@
               </a:rPr>
               <a:t>groupby</a:t>
             </a:r>
+            <a:endParaRPr lang="es-ES" sz="1000" i="1" spc="-1" dirty="0">
+              <a:solidFill>
+                <a:srgbClr val="CCCCCC"/>
+              </a:solidFill>
+              <a:latin typeface="Arial"/>
+            </a:endParaRPr>
+          </a:p>
+          <a:p>
+            <a:pPr marL="457200" indent="-291600">
+              <a:buClr>
+                <a:srgbClr val="CCCCCC"/>
+              </a:buClr>
+              <a:buFont typeface="Arial"/>
+              <a:buChar char="-"/>
+              <a:tabLst>
+                <a:tab pos="0" algn="l"/>
+              </a:tabLst>
+            </a:pPr>
+            <a:r>
+              <a:rPr lang="es-ES" sz="1000" b="0" i="1" strike="noStrike" spc="-1" dirty="0">
+                <a:solidFill>
+                  <a:srgbClr val="CCCCCC"/>
+                </a:solidFill>
+                <a:latin typeface="Arial"/>
+              </a:rPr>
+              <a:t>Trabajar con texto</a:t>
+            </a:r>
+          </a:p>
+          <a:p>
+            <a:pPr marL="457200" indent="-291600">
+              <a:buClr>
+                <a:srgbClr val="CCCCCC"/>
+              </a:buClr>
+              <a:buFont typeface="Arial"/>
+              <a:buChar char="-"/>
+              <a:tabLst>
+                <a:tab pos="0" algn="l"/>
+              </a:tabLst>
+            </a:pPr>
+            <a:r>
+              <a:rPr lang="es-ES" sz="1000" i="1" spc="-1" dirty="0">
+                <a:solidFill>
+                  <a:srgbClr val="CCCCCC"/>
+                </a:solidFill>
+                <a:latin typeface="Arial"/>
+              </a:rPr>
+              <a:t>Trabajar con Time Series</a:t>
+            </a:r>
             <a:endParaRPr lang="es-ES" sz="1000" b="0" strike="noStrike" spc="-1" dirty="0">
               <a:latin typeface="Arial"/>
             </a:endParaRPr>
@@ -5138,7 +5186,7 @@
         </p:nvSpPr>
         <p:spPr>
           <a:xfrm>
-            <a:off x="4238280" y="3030589"/>
+            <a:off x="4238280" y="3301014"/>
             <a:ext cx="3633120" cy="1772351"/>
           </a:xfrm>
           <a:prstGeom prst="rect">

</xml_diff>